<commit_message>
use medplanner colors for presi
</commit_message>
<xml_diff>
--- a/sys-doc/documents/presentation/20210705_Presentation_TeamGruen.pptx
+++ b/sys-doc/documents/presentation/20210705_Presentation_TeamGruen.pptx
@@ -110,6 +110,11 @@
       </a:defRPr>
     </a:lvl9pPr>
   </p:defaultTextStyle>
+  <p:extLst>
+    <p:ext uri="{EFAFB233-063F-42B5-8137-9DF3F51BA10A}">
+      <p15:sldGuideLst xmlns:p15="http://schemas.microsoft.com/office/powerpoint/2012/main"/>
+    </p:ext>
+  </p:extLst>
 </p:presentation>
 </file>
 
@@ -195,7 +200,7 @@
           <a:p>
             <a:fld id="{2AC471E8-63C8-4515-AF68-052AA1FB1B63}" type="datetimeFigureOut">
               <a:rPr lang="de-DE" smtClean="0"/>
-              <a:t>30.06.2021</a:t>
+              <a:t>01.07.2021</a:t>
             </a:fld>
             <a:endParaRPr lang="de-DE"/>
           </a:p>
@@ -3722,11 +3727,11 @@
             <a:avLst/>
           </a:prstGeom>
           <a:solidFill>
-            <a:srgbClr val="4FB3BF"/>
+            <a:srgbClr val="80CBC4"/>
           </a:solidFill>
           <a:ln>
             <a:solidFill>
-              <a:srgbClr val="4FB3BF"/>
+              <a:srgbClr val="80CBC4"/>
             </a:solidFill>
           </a:ln>
         </p:spPr>
@@ -3866,11 +3871,11 @@
             <a:avLst/>
           </a:prstGeom>
           <a:solidFill>
-            <a:srgbClr val="00838F"/>
+            <a:srgbClr val="4F9A94"/>
           </a:solidFill>
           <a:ln>
             <a:solidFill>
-              <a:srgbClr val="00838F"/>
+              <a:srgbClr val="4F9A94"/>
             </a:solidFill>
           </a:ln>
         </p:spPr>
@@ -3959,11 +3964,11 @@
             <a:avLst/>
           </a:prstGeom>
           <a:solidFill>
-            <a:srgbClr val="00838F"/>
+            <a:srgbClr val="4F9A94"/>
           </a:solidFill>
           <a:ln>
             <a:solidFill>
-              <a:srgbClr val="00838F"/>
+              <a:srgbClr val="4F9A94"/>
             </a:solidFill>
           </a:ln>
         </p:spPr>
@@ -4312,11 +4317,11 @@
             <a:avLst/>
           </a:prstGeom>
           <a:solidFill>
-            <a:srgbClr val="00838F"/>
+            <a:srgbClr val="4F9A94"/>
           </a:solidFill>
           <a:ln>
             <a:solidFill>
-              <a:srgbClr val="00838F"/>
+              <a:srgbClr val="4F9A94"/>
             </a:solidFill>
           </a:ln>
         </p:spPr>
@@ -4569,11 +4574,11 @@
             <a:avLst/>
           </a:prstGeom>
           <a:solidFill>
-            <a:srgbClr val="00838F"/>
+            <a:srgbClr val="4F9A94"/>
           </a:solidFill>
           <a:ln>
             <a:solidFill>
-              <a:srgbClr val="00838F"/>
+              <a:srgbClr val="4F9A94"/>
             </a:solidFill>
           </a:ln>
         </p:spPr>

</xml_diff>

<commit_message>
add token authentication + link for live demo
</commit_message>
<xml_diff>
--- a/sys-doc/documents/presentation/20210705_Presentation_TeamGruen.pptx
+++ b/sys-doc/documents/presentation/20210705_Presentation_TeamGruen.pptx
@@ -5,13 +5,14 @@
     <p:sldMasterId id="2147483648" r:id="rId1"/>
   </p:sldMasterIdLst>
   <p:notesMasterIdLst>
-    <p:notesMasterId r:id="rId6"/>
+    <p:notesMasterId r:id="rId7"/>
   </p:notesMasterIdLst>
   <p:sldIdLst>
     <p:sldId id="256" r:id="rId2"/>
     <p:sldId id="257" r:id="rId3"/>
     <p:sldId id="258" r:id="rId4"/>
-    <p:sldId id="259" r:id="rId5"/>
+    <p:sldId id="260" r:id="rId5"/>
+    <p:sldId id="259" r:id="rId6"/>
   </p:sldIdLst>
   <p:sldSz cx="12192000" cy="6858000"/>
   <p:notesSz cx="6858000" cy="9144000"/>
@@ -200,7 +201,7 @@
           <a:p>
             <a:fld id="{2AC471E8-63C8-4515-AF68-052AA1FB1B63}" type="datetimeFigureOut">
               <a:rPr lang="de-DE" smtClean="0"/>
-              <a:t>01.07.2021</a:t>
+              <a:t>02.07.2021</a:t>
             </a:fld>
             <a:endParaRPr lang="de-DE"/>
           </a:p>
@@ -4639,7 +4640,7 @@
           <a:p>
             <a:r>
               <a:rPr lang="de-DE" dirty="0"/>
-              <a:t>Live-Demonstration</a:t>
+              <a:t>Authentifizierung</a:t>
             </a:r>
           </a:p>
         </p:txBody>
@@ -4745,9 +4746,409 @@
           </a:p>
         </p:txBody>
       </p:sp>
+      <p:sp>
+        <p:nvSpPr>
+          <p:cNvPr id="8" name="Inhaltsplatzhalter 7">
+            <a:extLst>
+              <a:ext uri="{FF2B5EF4-FFF2-40B4-BE49-F238E27FC236}">
+                <a16:creationId xmlns:a16="http://schemas.microsoft.com/office/drawing/2014/main" id="{75B00ED9-6FA7-4EC6-BEEB-07AB97F9DE30}"/>
+              </a:ext>
+            </a:extLst>
+          </p:cNvPr>
+          <p:cNvSpPr>
+            <a:spLocks noGrp="1"/>
+          </p:cNvSpPr>
+          <p:nvPr>
+            <p:ph idx="1"/>
+          </p:nvPr>
+        </p:nvSpPr>
+        <p:spPr>
+          <a:xfrm>
+            <a:off x="838200" y="2236618"/>
+            <a:ext cx="10515600" cy="1774938"/>
+          </a:xfrm>
+        </p:spPr>
+        <p:txBody>
+          <a:bodyPr/>
+          <a:lstStyle/>
+          <a:p>
+            <a:r>
+              <a:rPr lang="de-DE" dirty="0"/>
+              <a:t>Zustandslose Authentifizierung mittels Tokens</a:t>
+            </a:r>
+          </a:p>
+          <a:p>
+            <a:r>
+              <a:rPr lang="de-DE" dirty="0"/>
+              <a:t>Nutzung der Anwendung ohne zusätzliche Angaben von Benutzerinformationen</a:t>
+            </a:r>
+          </a:p>
+        </p:txBody>
+      </p:sp>
+      <p:grpSp>
+        <p:nvGrpSpPr>
+          <p:cNvPr id="18" name="Gruppieren 17">
+            <a:extLst>
+              <a:ext uri="{FF2B5EF4-FFF2-40B4-BE49-F238E27FC236}">
+                <a16:creationId xmlns:a16="http://schemas.microsoft.com/office/drawing/2014/main" id="{EB4767A6-1FAA-4E5F-B504-2BA90929F5F5}"/>
+              </a:ext>
+            </a:extLst>
+          </p:cNvPr>
+          <p:cNvGrpSpPr/>
+          <p:nvPr/>
+        </p:nvGrpSpPr>
+        <p:grpSpPr>
+          <a:xfrm>
+            <a:off x="5097424" y="3939334"/>
+            <a:ext cx="1997150" cy="1997150"/>
+            <a:chOff x="5097424" y="3939334"/>
+            <a:chExt cx="1997150" cy="1997150"/>
+          </a:xfrm>
+        </p:grpSpPr>
+        <p:pic>
+          <p:nvPicPr>
+            <p:cNvPr id="11" name="Grafik 10" descr="Benutzer Silhouette">
+              <a:extLst>
+                <a:ext uri="{FF2B5EF4-FFF2-40B4-BE49-F238E27FC236}">
+                  <a16:creationId xmlns:a16="http://schemas.microsoft.com/office/drawing/2014/main" id="{44C1E9CB-84D7-403B-9399-CEE54585A9D8}"/>
+                </a:ext>
+              </a:extLst>
+            </p:cNvPr>
+            <p:cNvPicPr>
+              <a:picLocks noChangeAspect="1"/>
+            </p:cNvPicPr>
+            <p:nvPr/>
+          </p:nvPicPr>
+          <p:blipFill>
+            <a:blip r:embed="rId2">
+              <a:extLst>
+                <a:ext uri="{28A0092B-C50C-407E-A947-70E740481C1C}">
+                  <a14:useLocalDpi xmlns:a14="http://schemas.microsoft.com/office/drawing/2010/main" val="0"/>
+                </a:ext>
+                <a:ext uri="{96DAC541-7B7A-43D3-8B79-37D633B846F1}">
+                  <asvg:svgBlip xmlns:asvg="http://schemas.microsoft.com/office/drawing/2016/SVG/main" r:embed="rId3"/>
+                </a:ext>
+              </a:extLst>
+            </a:blip>
+            <a:stretch>
+              <a:fillRect/>
+            </a:stretch>
+          </p:blipFill>
+          <p:spPr>
+            <a:xfrm>
+              <a:off x="5548312" y="4264921"/>
+              <a:ext cx="1095375" cy="1095375"/>
+            </a:xfrm>
+            <a:prstGeom prst="rect">
+              <a:avLst/>
+            </a:prstGeom>
+          </p:spPr>
+        </p:pic>
+        <p:pic>
+          <p:nvPicPr>
+            <p:cNvPr id="15" name="Grafik 14" descr="Schild Silhouette">
+              <a:extLst>
+                <a:ext uri="{FF2B5EF4-FFF2-40B4-BE49-F238E27FC236}">
+                  <a16:creationId xmlns:a16="http://schemas.microsoft.com/office/drawing/2014/main" id="{BA8AF8D5-EBF1-417E-9791-B218386DF7C1}"/>
+                </a:ext>
+              </a:extLst>
+            </p:cNvPr>
+            <p:cNvPicPr>
+              <a:picLocks noChangeAspect="1"/>
+            </p:cNvPicPr>
+            <p:nvPr/>
+          </p:nvPicPr>
+          <p:blipFill>
+            <a:blip r:embed="rId4">
+              <a:extLst>
+                <a:ext uri="{28A0092B-C50C-407E-A947-70E740481C1C}">
+                  <a14:useLocalDpi xmlns:a14="http://schemas.microsoft.com/office/drawing/2010/main" val="0"/>
+                </a:ext>
+                <a:ext uri="{96DAC541-7B7A-43D3-8B79-37D633B846F1}">
+                  <asvg:svgBlip xmlns:asvg="http://schemas.microsoft.com/office/drawing/2016/SVG/main" r:embed="rId5"/>
+                </a:ext>
+              </a:extLst>
+            </a:blip>
+            <a:stretch>
+              <a:fillRect/>
+            </a:stretch>
+          </p:blipFill>
+          <p:spPr>
+            <a:xfrm>
+              <a:off x="5097424" y="3939334"/>
+              <a:ext cx="1997150" cy="1997150"/>
+            </a:xfrm>
+            <a:prstGeom prst="rect">
+              <a:avLst/>
+            </a:prstGeom>
+          </p:spPr>
+        </p:pic>
+      </p:grpSp>
+      <p:pic>
+        <p:nvPicPr>
+          <p:cNvPr id="17" name="Grafik 16" descr="Häkchen mit einfarbiger Füllung">
+            <a:extLst>
+              <a:ext uri="{FF2B5EF4-FFF2-40B4-BE49-F238E27FC236}">
+                <a16:creationId xmlns:a16="http://schemas.microsoft.com/office/drawing/2014/main" id="{758BB550-2168-47E9-9960-6388DBB9A28D}"/>
+              </a:ext>
+            </a:extLst>
+          </p:cNvPr>
+          <p:cNvPicPr>
+            <a:picLocks noChangeAspect="1"/>
+          </p:cNvPicPr>
+          <p:nvPr/>
+        </p:nvPicPr>
+        <p:blipFill>
+          <a:blip r:embed="rId6">
+            <a:extLst>
+              <a:ext uri="{28A0092B-C50C-407E-A947-70E740481C1C}">
+                <a14:useLocalDpi xmlns:a14="http://schemas.microsoft.com/office/drawing/2010/main" val="0"/>
+              </a:ext>
+              <a:ext uri="{96DAC541-7B7A-43D3-8B79-37D633B846F1}">
+                <asvg:svgBlip xmlns:asvg="http://schemas.microsoft.com/office/drawing/2016/SVG/main" r:embed="rId7"/>
+              </a:ext>
+            </a:extLst>
+          </a:blip>
+          <a:stretch>
+            <a:fillRect/>
+          </a:stretch>
+        </p:blipFill>
+        <p:spPr>
+          <a:xfrm>
+            <a:off x="6257925" y="4978475"/>
+            <a:ext cx="914400" cy="914400"/>
+          </a:xfrm>
+          <a:prstGeom prst="rect">
+            <a:avLst/>
+          </a:prstGeom>
+        </p:spPr>
+      </p:pic>
+    </p:spTree>
+    <p:extLst>
+      <p:ext uri="{BB962C8B-B14F-4D97-AF65-F5344CB8AC3E}">
+        <p14:creationId xmlns:p14="http://schemas.microsoft.com/office/powerpoint/2010/main" val="1519782494"/>
+      </p:ext>
+    </p:extLst>
+  </p:cSld>
+  <p:clrMapOvr>
+    <a:masterClrMapping/>
+  </p:clrMapOvr>
+</p:sld>
+</file>
+
+<file path=ppt/slides/slide5.xml><?xml version="1.0" encoding="utf-8"?>
+<p:sld xmlns:a="http://schemas.openxmlformats.org/drawingml/2006/main" xmlns:r="http://schemas.openxmlformats.org/officeDocument/2006/relationships" xmlns:p="http://schemas.openxmlformats.org/presentationml/2006/main">
+  <p:cSld>
+    <p:spTree>
+      <p:nvGrpSpPr>
+        <p:cNvPr id="1" name=""/>
+        <p:cNvGrpSpPr/>
+        <p:nvPr/>
+      </p:nvGrpSpPr>
+      <p:grpSpPr>
+        <a:xfrm>
+          <a:off x="0" y="0"/>
+          <a:ext cx="0" cy="0"/>
+          <a:chOff x="0" y="0"/>
+          <a:chExt cx="0" cy="0"/>
+        </a:xfrm>
+      </p:grpSpPr>
+      <p:sp>
+        <p:nvSpPr>
+          <p:cNvPr id="7" name="Rechteck 6">
+            <a:extLst>
+              <a:ext uri="{FF2B5EF4-FFF2-40B4-BE49-F238E27FC236}">
+                <a16:creationId xmlns:a16="http://schemas.microsoft.com/office/drawing/2014/main" id="{3BE821A0-96B9-46F7-8662-9F38EA5DCFF2}"/>
+              </a:ext>
+            </a:extLst>
+          </p:cNvPr>
+          <p:cNvSpPr/>
+          <p:nvPr/>
+        </p:nvSpPr>
+        <p:spPr>
+          <a:xfrm>
+            <a:off x="0" y="6343799"/>
+            <a:ext cx="12192000" cy="377676"/>
+          </a:xfrm>
+          <a:prstGeom prst="rect">
+            <a:avLst/>
+          </a:prstGeom>
+          <a:solidFill>
+            <a:srgbClr val="4F9A94"/>
+          </a:solidFill>
+          <a:ln>
+            <a:solidFill>
+              <a:srgbClr val="4F9A94"/>
+            </a:solidFill>
+          </a:ln>
+        </p:spPr>
+        <p:style>
+          <a:lnRef idx="2">
+            <a:schemeClr val="accent1">
+              <a:shade val="50000"/>
+            </a:schemeClr>
+          </a:lnRef>
+          <a:fillRef idx="1">
+            <a:schemeClr val="accent1"/>
+          </a:fillRef>
+          <a:effectRef idx="0">
+            <a:schemeClr val="accent1"/>
+          </a:effectRef>
+          <a:fontRef idx="minor">
+            <a:schemeClr val="lt1"/>
+          </a:fontRef>
+        </p:style>
+        <p:txBody>
+          <a:bodyPr rtlCol="0" anchor="ctr"/>
+          <a:lstStyle/>
+          <a:p>
+            <a:pPr algn="ctr"/>
+            <a:endParaRPr lang="de-DE" dirty="0">
+              <a:ln>
+                <a:solidFill>
+                  <a:sysClr val="windowText" lastClr="000000"/>
+                </a:solidFill>
+              </a:ln>
+              <a:solidFill>
+                <a:sysClr val="windowText" lastClr="000000"/>
+              </a:solidFill>
+            </a:endParaRPr>
+          </a:p>
+        </p:txBody>
+      </p:sp>
+      <p:sp>
+        <p:nvSpPr>
+          <p:cNvPr id="2" name="Titel 1">
+            <a:extLst>
+              <a:ext uri="{FF2B5EF4-FFF2-40B4-BE49-F238E27FC236}">
+                <a16:creationId xmlns:a16="http://schemas.microsoft.com/office/drawing/2014/main" id="{4F05445C-19ED-4B0D-B6C8-500D186D915C}"/>
+              </a:ext>
+            </a:extLst>
+          </p:cNvPr>
+          <p:cNvSpPr>
+            <a:spLocks noGrp="1"/>
+          </p:cNvSpPr>
+          <p:nvPr>
+            <p:ph type="title"/>
+          </p:nvPr>
+        </p:nvSpPr>
+        <p:spPr/>
+        <p:txBody>
+          <a:bodyPr/>
+          <a:lstStyle/>
+          <a:p>
+            <a:r>
+              <a:rPr lang="de-DE" dirty="0"/>
+              <a:t>Live-Demonstration</a:t>
+            </a:r>
+          </a:p>
+        </p:txBody>
+      </p:sp>
+      <p:sp>
+        <p:nvSpPr>
+          <p:cNvPr id="4" name="Datumsplatzhalter 3">
+            <a:extLst>
+              <a:ext uri="{FF2B5EF4-FFF2-40B4-BE49-F238E27FC236}">
+                <a16:creationId xmlns:a16="http://schemas.microsoft.com/office/drawing/2014/main" id="{99F7C148-C3BD-4526-A29E-CB415FA5841A}"/>
+              </a:ext>
+            </a:extLst>
+          </p:cNvPr>
+          <p:cNvSpPr>
+            <a:spLocks noGrp="1"/>
+          </p:cNvSpPr>
+          <p:nvPr>
+            <p:ph type="dt" sz="half" idx="10"/>
+          </p:nvPr>
+        </p:nvSpPr>
+        <p:spPr/>
+        <p:txBody>
+          <a:bodyPr/>
+          <a:lstStyle/>
+          <a:p>
+            <a:r>
+              <a:rPr lang="de-DE" dirty="0">
+                <a:solidFill>
+                  <a:schemeClr val="bg1"/>
+                </a:solidFill>
+              </a:rPr>
+              <a:t>05.07.2021</a:t>
+            </a:r>
+          </a:p>
+        </p:txBody>
+      </p:sp>
+      <p:sp>
+        <p:nvSpPr>
+          <p:cNvPr id="5" name="Fußzeilenplatzhalter 4">
+            <a:extLst>
+              <a:ext uri="{FF2B5EF4-FFF2-40B4-BE49-F238E27FC236}">
+                <a16:creationId xmlns:a16="http://schemas.microsoft.com/office/drawing/2014/main" id="{B64DDC98-F52E-4B68-B008-62F1868E311B}"/>
+              </a:ext>
+            </a:extLst>
+          </p:cNvPr>
+          <p:cNvSpPr>
+            <a:spLocks noGrp="1"/>
+          </p:cNvSpPr>
+          <p:nvPr>
+            <p:ph type="ftr" sz="quarter" idx="11"/>
+          </p:nvPr>
+        </p:nvSpPr>
+        <p:spPr/>
+        <p:txBody>
+          <a:bodyPr/>
+          <a:lstStyle/>
+          <a:p>
+            <a:r>
+              <a:rPr lang="de-DE" dirty="0">
+                <a:solidFill>
+                  <a:schemeClr val="bg1"/>
+                </a:solidFill>
+              </a:rPr>
+              <a:t>Team Grün</a:t>
+            </a:r>
+          </a:p>
+        </p:txBody>
+      </p:sp>
+      <p:sp>
+        <p:nvSpPr>
+          <p:cNvPr id="6" name="Foliennummernplatzhalter 5">
+            <a:extLst>
+              <a:ext uri="{FF2B5EF4-FFF2-40B4-BE49-F238E27FC236}">
+                <a16:creationId xmlns:a16="http://schemas.microsoft.com/office/drawing/2014/main" id="{E49CBF1F-2605-4F23-8967-C416DAB99337}"/>
+              </a:ext>
+            </a:extLst>
+          </p:cNvPr>
+          <p:cNvSpPr>
+            <a:spLocks noGrp="1"/>
+          </p:cNvSpPr>
+          <p:nvPr>
+            <p:ph type="sldNum" sz="quarter" idx="12"/>
+          </p:nvPr>
+        </p:nvSpPr>
+        <p:spPr/>
+        <p:txBody>
+          <a:bodyPr/>
+          <a:lstStyle/>
+          <a:p>
+            <a:fld id="{8740562D-63D4-401E-B242-5D5779BC8B55}" type="slidenum">
+              <a:rPr lang="de-DE" smtClean="0">
+                <a:solidFill>
+                  <a:schemeClr val="bg1"/>
+                </a:solidFill>
+              </a:rPr>
+              <a:t>5</a:t>
+            </a:fld>
+            <a:endParaRPr lang="de-DE" dirty="0">
+              <a:solidFill>
+                <a:schemeClr val="bg1"/>
+              </a:solidFill>
+            </a:endParaRPr>
+          </a:p>
+        </p:txBody>
+      </p:sp>
       <p:pic>
         <p:nvPicPr>
           <p:cNvPr id="10" name="Inhaltsplatzhalter 9">
+            <a:hlinkClick r:id="rId2"/>
             <a:extLst>
               <a:ext uri="{FF2B5EF4-FFF2-40B4-BE49-F238E27FC236}">
                 <a16:creationId xmlns:a16="http://schemas.microsoft.com/office/drawing/2014/main" id="{E5443C31-C79D-407E-9A7C-7598F99B26DF}"/>
@@ -4762,13 +5163,13 @@
           </p:nvPr>
         </p:nvPicPr>
         <p:blipFill>
-          <a:blip r:embed="rId2">
+          <a:blip r:embed="rId3">
             <a:extLst>
               <a:ext uri="{28A0092B-C50C-407E-A947-70E740481C1C}">
                 <a14:useLocalDpi xmlns:a14="http://schemas.microsoft.com/office/drawing/2010/main" val="0"/>
               </a:ext>
               <a:ext uri="{96DAC541-7B7A-43D3-8B79-37D633B846F1}">
-                <asvg:svgBlip xmlns:asvg="http://schemas.microsoft.com/office/drawing/2016/SVG/main" r:embed="rId3"/>
+                <asvg:svgBlip xmlns:asvg="http://schemas.microsoft.com/office/drawing/2016/SVG/main" r:embed="rId4"/>
               </a:ext>
             </a:extLst>
           </a:blip>

</xml_diff>